<commit_message>
Edit developer guide to reflect two-level parser (#63)
</commit_message>
<xml_diff>
--- a/docs/diagrams/LogicComponentClassDiagram.pptx
+++ b/docs/diagrams/LogicComponentClassDiagram.pptx
@@ -126,10 +126,6 @@
 </p:presentation>
 </file>
 
-<file path=ppt/revisionInfo.xml><?xml version="1.0" encoding="utf-8"?>
-<p1510:revInfo xmlns:a="http://schemas.openxmlformats.org/drawingml/2006/main" xmlns:r="http://schemas.openxmlformats.org/officeDocument/2006/relationships" xmlns:p1510="http://schemas.microsoft.com/office/powerpoint/2015/10/main"/>
-</file>
-
 <file path=ppt/notesMasters/notesMaster1.xml><?xml version="1.0" encoding="utf-8"?>
 <p:notesMaster xmlns:a="http://schemas.openxmlformats.org/drawingml/2006/main" xmlns:r="http://schemas.openxmlformats.org/officeDocument/2006/relationships" xmlns:p="http://schemas.openxmlformats.org/presentationml/2006/main">
   <p:cSld>
@@ -212,7 +208,7 @@
           <a:p>
             <a:fld id="{F5CC4B3F-88C1-4FFA-B1B6-F41C21DC6924}" type="datetimeFigureOut">
               <a:rPr lang="en-US" smtClean="0"/>
-              <a:t>4/16/2018</a:t>
+              <a:t>10/17/2018</a:t>
             </a:fld>
             <a:endParaRPr lang="en-US"/>
           </a:p>
@@ -658,7 +654,7 @@
           <a:p>
             <a:fld id="{78C97017-6FC3-485B-9764-EAC9E56C1D49}" type="datetimeFigureOut">
               <a:rPr lang="en-US" smtClean="0"/>
-              <a:t>4/16/2018</a:t>
+              <a:t>10/17/2018</a:t>
             </a:fld>
             <a:endParaRPr lang="en-US"/>
           </a:p>
@@ -826,7 +822,7 @@
           <a:p>
             <a:fld id="{78C97017-6FC3-485B-9764-EAC9E56C1D49}" type="datetimeFigureOut">
               <a:rPr lang="en-US" smtClean="0"/>
-              <a:t>4/16/2018</a:t>
+              <a:t>10/17/2018</a:t>
             </a:fld>
             <a:endParaRPr lang="en-US"/>
           </a:p>
@@ -1004,7 +1000,7 @@
           <a:p>
             <a:fld id="{78C97017-6FC3-485B-9764-EAC9E56C1D49}" type="datetimeFigureOut">
               <a:rPr lang="en-US" smtClean="0"/>
-              <a:t>4/16/2018</a:t>
+              <a:t>10/17/2018</a:t>
             </a:fld>
             <a:endParaRPr lang="en-US"/>
           </a:p>
@@ -1172,7 +1168,7 @@
           <a:p>
             <a:fld id="{78C97017-6FC3-485B-9764-EAC9E56C1D49}" type="datetimeFigureOut">
               <a:rPr lang="en-US" smtClean="0"/>
-              <a:t>4/16/2018</a:t>
+              <a:t>10/17/2018</a:t>
             </a:fld>
             <a:endParaRPr lang="en-US"/>
           </a:p>
@@ -1417,7 +1413,7 @@
           <a:p>
             <a:fld id="{78C97017-6FC3-485B-9764-EAC9E56C1D49}" type="datetimeFigureOut">
               <a:rPr lang="en-US" smtClean="0"/>
-              <a:t>4/16/2018</a:t>
+              <a:t>10/17/2018</a:t>
             </a:fld>
             <a:endParaRPr lang="en-US"/>
           </a:p>
@@ -1702,7 +1698,7 @@
           <a:p>
             <a:fld id="{78C97017-6FC3-485B-9764-EAC9E56C1D49}" type="datetimeFigureOut">
               <a:rPr lang="en-US" smtClean="0"/>
-              <a:t>4/16/2018</a:t>
+              <a:t>10/17/2018</a:t>
             </a:fld>
             <a:endParaRPr lang="en-US"/>
           </a:p>
@@ -2121,7 +2117,7 @@
           <a:p>
             <a:fld id="{78C97017-6FC3-485B-9764-EAC9E56C1D49}" type="datetimeFigureOut">
               <a:rPr lang="en-US" smtClean="0"/>
-              <a:t>4/16/2018</a:t>
+              <a:t>10/17/2018</a:t>
             </a:fld>
             <a:endParaRPr lang="en-US"/>
           </a:p>
@@ -2238,7 +2234,7 @@
           <a:p>
             <a:fld id="{78C97017-6FC3-485B-9764-EAC9E56C1D49}" type="datetimeFigureOut">
               <a:rPr lang="en-US" smtClean="0"/>
-              <a:t>4/16/2018</a:t>
+              <a:t>10/17/2018</a:t>
             </a:fld>
             <a:endParaRPr lang="en-US"/>
           </a:p>
@@ -2333,7 +2329,7 @@
           <a:p>
             <a:fld id="{78C97017-6FC3-485B-9764-EAC9E56C1D49}" type="datetimeFigureOut">
               <a:rPr lang="en-US" smtClean="0"/>
-              <a:t>4/16/2018</a:t>
+              <a:t>10/17/2018</a:t>
             </a:fld>
             <a:endParaRPr lang="en-US"/>
           </a:p>
@@ -2608,7 +2604,7 @@
           <a:p>
             <a:fld id="{78C97017-6FC3-485B-9764-EAC9E56C1D49}" type="datetimeFigureOut">
               <a:rPr lang="en-US" smtClean="0"/>
-              <a:t>4/16/2018</a:t>
+              <a:t>10/17/2018</a:t>
             </a:fld>
             <a:endParaRPr lang="en-US"/>
           </a:p>
@@ -2860,7 +2856,7 @@
           <a:p>
             <a:fld id="{78C97017-6FC3-485B-9764-EAC9E56C1D49}" type="datetimeFigureOut">
               <a:rPr lang="en-US" smtClean="0"/>
-              <a:t>4/16/2018</a:t>
+              <a:t>10/17/2018</a:t>
             </a:fld>
             <a:endParaRPr lang="en-US"/>
           </a:p>
@@ -3071,7 +3067,7 @@
           <a:p>
             <a:fld id="{78C97017-6FC3-485B-9764-EAC9E56C1D49}" type="datetimeFigureOut">
               <a:rPr lang="en-US" smtClean="0"/>
-              <a:t>4/16/2018</a:t>
+              <a:t>10/17/2018</a:t>
             </a:fld>
             <a:endParaRPr lang="en-US"/>
           </a:p>
@@ -3607,7 +3603,7 @@
           <a:p>
             <a:pPr algn="ctr"/>
             <a:r>
-              <a:rPr lang="en-US" sz="1050" b="1" dirty="0" err="1" smtClean="0">
+              <a:rPr lang="en-US" sz="1050" b="1" dirty="0" err="1">
                 <a:solidFill>
                   <a:srgbClr val="0070C0"/>
                 </a:solidFill>
@@ -3939,18 +3935,13 @@
           <a:p>
             <a:pPr algn="ctr"/>
             <a:r>
-              <a:rPr lang="en-US" sz="1050" dirty="0" err="1" smtClean="0">
+              <a:rPr lang="en-US" sz="1050" dirty="0">
                 <a:solidFill>
                   <a:schemeClr val="bg1"/>
                 </a:solidFill>
               </a:rPr>
-              <a:t>AddressBook</a:t>
-            </a:r>
-            <a:endParaRPr lang="en-US" sz="1050" dirty="0">
-              <a:solidFill>
-                <a:schemeClr val="bg1"/>
-              </a:solidFill>
-            </a:endParaRPr>
+              <a:t>App</a:t>
+            </a:r>
           </a:p>
           <a:p>
             <a:pPr algn="ctr"/>
@@ -4957,7 +4948,7 @@
         </p:nvGrpSpPr>
         <p:grpSpPr>
           <a:xfrm rot="10800000">
-            <a:off x="4687086" y="3784757"/>
+            <a:off x="4443413" y="3793199"/>
             <a:ext cx="555486" cy="254462"/>
             <a:chOff x="3703306" y="644022"/>
             <a:chExt cx="555486" cy="230832"/>
@@ -5815,7 +5806,7 @@
           <a:p>
             <a:pPr algn="ctr"/>
             <a:r>
-              <a:rPr lang="en-US" sz="1050" b="1" dirty="0" err="1" smtClean="0">
+              <a:rPr lang="en-US" sz="1050" b="1" dirty="0" err="1">
                 <a:solidFill>
                   <a:schemeClr val="bg1"/>
                 </a:solidFill>
@@ -6038,17 +6029,18 @@
         <p:nvCxnSpPr>
           <p:cNvPr id="51" name="Elbow Connector 50"/>
           <p:cNvCxnSpPr>
+            <a:cxnSpLocks/>
             <a:stCxn id="16" idx="3"/>
-            <a:endCxn id="42" idx="2"/>
+            <a:endCxn id="61" idx="3"/>
           </p:cNvCxnSpPr>
           <p:nvPr/>
         </p:nvCxnSpPr>
         <p:spPr>
           <a:xfrm flipV="1">
-            <a:off x="4300741" y="3087571"/>
-            <a:ext cx="1269594" cy="659673"/>
-          </a:xfrm>
-          <a:prstGeom prst="bentConnector2">
+            <a:off x="4300741" y="3746887"/>
+            <a:ext cx="773601" cy="357"/>
+          </a:xfrm>
+          <a:prstGeom prst="straightConnector1">
             <a:avLst/>
           </a:prstGeom>
           <a:ln w="19050">
@@ -6165,7 +6157,7 @@
           <a:p>
             <a:pPr algn="ctr"/>
             <a:r>
-              <a:rPr lang="en-US" sz="1050" dirty="0" err="1" smtClean="0">
+              <a:rPr lang="en-US" sz="1050" dirty="0" err="1">
                 <a:solidFill>
                   <a:schemeClr val="bg1"/>
                 </a:solidFill>
@@ -6173,7 +6165,7 @@
               <a:t>XYZCommand</a:t>
             </a:r>
             <a:r>
-              <a:rPr lang="en-US" sz="1050" dirty="0" smtClean="0">
+              <a:rPr lang="en-US" sz="1050" dirty="0">
                 <a:solidFill>
                   <a:schemeClr val="bg1"/>
                 </a:solidFill>
@@ -6181,7 +6173,7 @@
               <a:t> = </a:t>
             </a:r>
             <a:r>
-              <a:rPr lang="en-US" sz="1050" dirty="0" err="1" smtClean="0">
+              <a:rPr lang="en-US" sz="1050" dirty="0" err="1">
                 <a:solidFill>
                   <a:schemeClr val="bg1"/>
                 </a:solidFill>
@@ -6189,7 +6181,7 @@
               <a:t>AddCommand</a:t>
             </a:r>
             <a:r>
-              <a:rPr lang="en-US" sz="1050" dirty="0" smtClean="0">
+              <a:rPr lang="en-US" sz="1050" dirty="0">
                 <a:solidFill>
                   <a:schemeClr val="bg1"/>
                 </a:solidFill>
@@ -6197,7 +6189,7 @@
               <a:t>, </a:t>
             </a:r>
             <a:r>
-              <a:rPr lang="en-US" sz="1050" dirty="0" err="1" smtClean="0">
+              <a:rPr lang="en-US" sz="1050" dirty="0" err="1">
                 <a:solidFill>
                   <a:schemeClr val="bg1"/>
                 </a:solidFill>
@@ -6205,14 +6197,83 @@
               <a:t>FindCommand</a:t>
             </a:r>
             <a:r>
-              <a:rPr lang="en-US" sz="1050" dirty="0" smtClean="0">
+              <a:rPr lang="en-US" sz="1050" dirty="0">
                 <a:solidFill>
                   <a:schemeClr val="bg1"/>
                 </a:solidFill>
               </a:rPr>
               <a:t>, etc.</a:t>
             </a:r>
-            <a:endParaRPr lang="en-US" sz="1050" dirty="0">
+          </a:p>
+        </p:txBody>
+      </p:sp>
+      <p:sp>
+        <p:nvSpPr>
+          <p:cNvPr id="61" name="Rectangle 11">
+            <a:extLst>
+              <a:ext uri="{FF2B5EF4-FFF2-40B4-BE49-F238E27FC236}">
+                <a16:creationId xmlns:a16="http://schemas.microsoft.com/office/drawing/2014/main" id="{B40D6D03-0DC3-4788-B3D5-9A33F7D538EA}"/>
+              </a:ext>
+            </a:extLst>
+          </p:cNvPr>
+          <p:cNvSpPr/>
+          <p:nvPr/>
+        </p:nvSpPr>
+        <p:spPr>
+          <a:xfrm flipH="1">
+            <a:off x="5074342" y="3573507"/>
+            <a:ext cx="991986" cy="346760"/>
+          </a:xfrm>
+          <a:prstGeom prst="rect">
+            <a:avLst/>
+          </a:prstGeom>
+          <a:solidFill>
+            <a:schemeClr val="accent5">
+              <a:alpha val="81000"/>
+            </a:schemeClr>
+          </a:solidFill>
+          <a:ln/>
+          <a:effectLst/>
+        </p:spPr>
+        <p:style>
+          <a:lnRef idx="1">
+            <a:schemeClr val="accent5"/>
+          </a:lnRef>
+          <a:fillRef idx="2">
+            <a:schemeClr val="accent5"/>
+          </a:fillRef>
+          <a:effectRef idx="1">
+            <a:schemeClr val="accent5"/>
+          </a:effectRef>
+          <a:fontRef idx="minor">
+            <a:schemeClr val="dk1"/>
+          </a:fontRef>
+        </p:style>
+        <p:txBody>
+          <a:bodyPr rtlCol="0" anchor="ctr"/>
+          <a:lstStyle/>
+          <a:p>
+            <a:pPr algn="ctr"/>
+            <a:r>
+              <a:rPr lang="en-US" sz="1050" b="1" dirty="0">
+                <a:solidFill>
+                  <a:schemeClr val="bg1"/>
+                </a:solidFill>
+              </a:rPr>
+              <a:t>Module</a:t>
+            </a:r>
+          </a:p>
+          <a:p>
+            <a:pPr algn="ctr"/>
+            <a:r>
+              <a:rPr lang="en-US" sz="1050" b="1" dirty="0">
+                <a:solidFill>
+                  <a:schemeClr val="bg1"/>
+                </a:solidFill>
+              </a:rPr>
+              <a:t>Parser</a:t>
+            </a:r>
+            <a:endParaRPr lang="en-SG" sz="1050" b="1" dirty="0">
               <a:solidFill>
                 <a:schemeClr val="bg1"/>
               </a:solidFill>
@@ -6220,6 +6281,243 @@
           </a:p>
         </p:txBody>
       </p:sp>
+      <p:cxnSp>
+        <p:nvCxnSpPr>
+          <p:cNvPr id="63" name="Elbow Connector 50">
+            <a:extLst>
+              <a:ext uri="{FF2B5EF4-FFF2-40B4-BE49-F238E27FC236}">
+                <a16:creationId xmlns:a16="http://schemas.microsoft.com/office/drawing/2014/main" id="{CA893F47-D98B-4BF2-8DE0-C1F3C4307613}"/>
+              </a:ext>
+            </a:extLst>
+          </p:cNvPr>
+          <p:cNvCxnSpPr>
+            <a:cxnSpLocks/>
+            <a:stCxn id="61" idx="0"/>
+            <a:endCxn id="42" idx="2"/>
+          </p:cNvCxnSpPr>
+          <p:nvPr/>
+        </p:nvCxnSpPr>
+        <p:spPr>
+          <a:xfrm flipV="1">
+            <a:off x="5570335" y="3087571"/>
+            <a:ext cx="0" cy="485936"/>
+          </a:xfrm>
+          <a:prstGeom prst="straightConnector1">
+            <a:avLst/>
+          </a:prstGeom>
+          <a:ln w="19050">
+            <a:solidFill>
+              <a:schemeClr val="accent5">
+                <a:lumMod val="75000"/>
+              </a:schemeClr>
+            </a:solidFill>
+            <a:prstDash val="sysDot"/>
+            <a:headEnd type="none" w="med" len="med"/>
+            <a:tailEnd type="arrow" w="med" len="med"/>
+          </a:ln>
+          <a:effectLst/>
+        </p:spPr>
+        <p:style>
+          <a:lnRef idx="1">
+            <a:schemeClr val="accent2"/>
+          </a:lnRef>
+          <a:fillRef idx="2">
+            <a:schemeClr val="accent2"/>
+          </a:fillRef>
+          <a:effectRef idx="1">
+            <a:schemeClr val="accent2"/>
+          </a:effectRef>
+          <a:fontRef idx="minor">
+            <a:schemeClr val="dk1"/>
+          </a:fontRef>
+        </p:style>
+      </p:cxnSp>
+      <p:sp>
+        <p:nvSpPr>
+          <p:cNvPr id="66" name="Folded Corner 126">
+            <a:extLst>
+              <a:ext uri="{FF2B5EF4-FFF2-40B4-BE49-F238E27FC236}">
+                <a16:creationId xmlns:a16="http://schemas.microsoft.com/office/drawing/2014/main" id="{D6F9FE88-7F68-4057-938C-96AC4E22EE6B}"/>
+              </a:ext>
+            </a:extLst>
+          </p:cNvPr>
+          <p:cNvSpPr/>
+          <p:nvPr/>
+        </p:nvSpPr>
+        <p:spPr>
+          <a:xfrm>
+            <a:off x="6128521" y="3404415"/>
+            <a:ext cx="1099749" cy="566451"/>
+          </a:xfrm>
+          <a:prstGeom prst="foldedCorner">
+            <a:avLst/>
+          </a:prstGeom>
+          <a:solidFill>
+            <a:schemeClr val="accent5">
+              <a:lumMod val="60000"/>
+              <a:lumOff val="40000"/>
+            </a:schemeClr>
+          </a:solidFill>
+          <a:ln w="19050">
+            <a:solidFill>
+              <a:schemeClr val="bg1"/>
+            </a:solidFill>
+          </a:ln>
+          <a:effectLst/>
+        </p:spPr>
+        <p:style>
+          <a:lnRef idx="1">
+            <a:schemeClr val="accent2"/>
+          </a:lnRef>
+          <a:fillRef idx="2">
+            <a:schemeClr val="accent2"/>
+          </a:fillRef>
+          <a:effectRef idx="1">
+            <a:schemeClr val="accent2"/>
+          </a:effectRef>
+          <a:fontRef idx="minor">
+            <a:schemeClr val="dk1"/>
+          </a:fontRef>
+        </p:style>
+        <p:txBody>
+          <a:bodyPr rtlCol="0" anchor="ctr"/>
+          <a:lstStyle/>
+          <a:p>
+            <a:pPr algn="ctr"/>
+            <a:r>
+              <a:rPr lang="en-US" sz="1050" dirty="0">
+                <a:solidFill>
+                  <a:schemeClr val="bg1"/>
+                </a:solidFill>
+              </a:rPr>
+              <a:t>Module = Contacts, Tasks, Calendar</a:t>
+            </a:r>
+          </a:p>
+        </p:txBody>
+      </p:sp>
+      <p:grpSp>
+        <p:nvGrpSpPr>
+          <p:cNvPr id="67" name="Group 66">
+            <a:extLst>
+              <a:ext uri="{FF2B5EF4-FFF2-40B4-BE49-F238E27FC236}">
+                <a16:creationId xmlns:a16="http://schemas.microsoft.com/office/drawing/2014/main" id="{B15346B3-F25F-4572-BBBB-C68875866135}"/>
+              </a:ext>
+            </a:extLst>
+          </p:cNvPr>
+          <p:cNvGrpSpPr/>
+          <p:nvPr/>
+        </p:nvGrpSpPr>
+        <p:grpSpPr>
+          <a:xfrm rot="10800000">
+            <a:off x="4935531" y="3259983"/>
+            <a:ext cx="564634" cy="254462"/>
+            <a:chOff x="3694158" y="644022"/>
+            <a:chExt cx="564634" cy="230832"/>
+          </a:xfrm>
+        </p:grpSpPr>
+        <p:sp>
+          <p:nvSpPr>
+            <p:cNvPr id="71" name="TextBox 70">
+              <a:extLst>
+                <a:ext uri="{FF2B5EF4-FFF2-40B4-BE49-F238E27FC236}">
+                  <a16:creationId xmlns:a16="http://schemas.microsoft.com/office/drawing/2014/main" id="{C3B4A9FD-4759-4F8B-B9F8-9BB4977F74C3}"/>
+                </a:ext>
+              </a:extLst>
+            </p:cNvPr>
+            <p:cNvSpPr txBox="1"/>
+            <p:nvPr/>
+          </p:nvSpPr>
+          <p:spPr>
+            <a:xfrm rot="10800000">
+              <a:off x="3703306" y="644022"/>
+              <a:ext cx="555486" cy="230832"/>
+            </a:xfrm>
+            <a:prstGeom prst="rect">
+              <a:avLst/>
+            </a:prstGeom>
+            <a:noFill/>
+          </p:spPr>
+          <p:txBody>
+            <a:bodyPr wrap="square" lIns="0" tIns="0" rIns="0" bIns="0" rtlCol="0">
+              <a:noAutofit/>
+            </a:bodyPr>
+            <a:lstStyle/>
+            <a:p>
+              <a:r>
+                <a:rPr lang="en-US" sz="1100" dirty="0">
+                  <a:solidFill>
+                    <a:schemeClr val="accent5">
+                      <a:lumMod val="75000"/>
+                    </a:schemeClr>
+                  </a:solidFill>
+                </a:rPr>
+                <a:t>creates</a:t>
+              </a:r>
+              <a:endParaRPr lang="en-SG" sz="1100" dirty="0">
+                <a:solidFill>
+                  <a:schemeClr val="accent5">
+                    <a:lumMod val="75000"/>
+                  </a:schemeClr>
+                </a:solidFill>
+              </a:endParaRPr>
+            </a:p>
+          </p:txBody>
+        </p:sp>
+        <p:sp>
+          <p:nvSpPr>
+            <p:cNvPr id="72" name="Isosceles Triangle 71">
+              <a:extLst>
+                <a:ext uri="{FF2B5EF4-FFF2-40B4-BE49-F238E27FC236}">
+                  <a16:creationId xmlns:a16="http://schemas.microsoft.com/office/drawing/2014/main" id="{9B590C80-7843-49A2-9EE7-FE5CD8ABF8CE}"/>
+                </a:ext>
+              </a:extLst>
+            </p:cNvPr>
+            <p:cNvSpPr/>
+            <p:nvPr/>
+          </p:nvSpPr>
+          <p:spPr>
+            <a:xfrm flipV="1">
+              <a:off x="3694158" y="745782"/>
+              <a:ext cx="132157" cy="79956"/>
+            </a:xfrm>
+            <a:prstGeom prst="triangle">
+              <a:avLst/>
+            </a:prstGeom>
+            <a:solidFill>
+              <a:schemeClr val="accent5">
+                <a:lumMod val="75000"/>
+              </a:schemeClr>
+            </a:solidFill>
+            <a:ln>
+              <a:noFill/>
+            </a:ln>
+          </p:spPr>
+          <p:style>
+            <a:lnRef idx="2">
+              <a:schemeClr val="accent1">
+                <a:shade val="50000"/>
+              </a:schemeClr>
+            </a:lnRef>
+            <a:fillRef idx="1">
+              <a:schemeClr val="accent1"/>
+            </a:fillRef>
+            <a:effectRef idx="0">
+              <a:schemeClr val="accent1"/>
+            </a:effectRef>
+            <a:fontRef idx="minor">
+              <a:schemeClr val="lt1"/>
+            </a:fontRef>
+          </p:style>
+          <p:txBody>
+            <a:bodyPr rtlCol="0" anchor="ctr"/>
+            <a:lstStyle/>
+            <a:p>
+              <a:pPr algn="ctr"/>
+              <a:endParaRPr lang="en-SG"/>
+            </a:p>
+          </p:txBody>
+        </p:sp>
+      </p:grpSp>
     </p:spTree>
     <p:extLst>
       <p:ext uri="{BB962C8B-B14F-4D97-AF65-F5344CB8AC3E}">

</xml_diff>